<commit_message>
source code box fix
</commit_message>
<xml_diff>
--- a/Document-Templates/SoftUni-PowerPoint-Template-Nov-2019.pptx
+++ b/Document-Templates/SoftUni-PowerPoint-Template-Nov-2019.pptx
@@ -301,7 +301,7 @@
           <a:p>
             <a:fld id="{4E087215-0C8F-4762-A664-737A353EC9A4}" type="datetimeFigureOut">
               <a:rPr lang="bg-BG" smtClean="0"/>
-              <a:t>17.4.2020 г.</a:t>
+              <a:t>21.10.2020 г.</a:t>
             </a:fld>
             <a:endParaRPr lang="bg-BG"/>
           </a:p>
@@ -492,7 +492,7 @@
           <a:p>
             <a:fld id="{72D84649-876A-46C9-8472-14CB09C070D8}" type="datetimeFigureOut">
               <a:rPr lang="en-US" smtClean="0"/>
-              <a:t>17-Apr-20</a:t>
+              <a:t>21-Oct-20</a:t>
             </a:fld>
             <a:endParaRPr lang="en-US"/>
           </a:p>
@@ -12657,140 +12657,6 @@
       </p:sp>
       <p:sp>
         <p:nvSpPr>
-          <p:cNvPr id="6" name="Code Box">
-            <a:extLst>
-              <a:ext uri="{FF2B5EF4-FFF2-40B4-BE49-F238E27FC236}">
-                <a16:creationId xmlns:a16="http://schemas.microsoft.com/office/drawing/2014/main" id="{3278A82F-5546-4977-9F75-2A933B415945}"/>
-              </a:ext>
-            </a:extLst>
-          </p:cNvPr>
-          <p:cNvSpPr>
-            <a:spLocks noGrp="1"/>
-          </p:cNvSpPr>
-          <p:nvPr>
-            <p:ph type="body" sz="quarter" idx="11" hasCustomPrompt="1"/>
-          </p:nvPr>
-        </p:nvSpPr>
-        <p:spPr>
-          <a:xfrm>
-            <a:off x="621234" y="1931154"/>
-            <a:ext cx="10949531" cy="1362846"/>
-          </a:xfrm>
-          <a:prstGeom prst="rect">
-            <a:avLst/>
-          </a:prstGeom>
-          <a:solidFill>
-            <a:schemeClr val="accent6">
-              <a:lumMod val="75000"/>
-              <a:alpha val="15000"/>
-            </a:schemeClr>
-          </a:solidFill>
-          <a:ln w="12700">
-            <a:solidFill>
-              <a:schemeClr val="tx1">
-                <a:lumMod val="50000"/>
-              </a:schemeClr>
-            </a:solidFill>
-          </a:ln>
-        </p:spPr>
-        <p:txBody>
-          <a:bodyPr wrap="square" lIns="144000" tIns="108000" rIns="144000" bIns="108000">
-            <a:spAutoFit/>
-          </a:bodyPr>
-          <a:lstStyle>
-            <a:lvl1pPr marL="0" indent="0" latinLnBrk="0">
-              <a:lnSpc>
-                <a:spcPct val="105000"/>
-              </a:lnSpc>
-              <a:spcBef>
-                <a:spcPts val="0"/>
-              </a:spcBef>
-              <a:spcAft>
-                <a:spcPts val="0"/>
-              </a:spcAft>
-              <a:buNone/>
-              <a:defRPr lang="en-US" sz="2398" b="1" noProof="1" smtClean="0">
-                <a:solidFill>
-                  <a:schemeClr val="tx1"/>
-                </a:solidFill>
-                <a:effectLst/>
-                <a:latin typeface="Consolas" pitchFamily="49" charset="0"/>
-                <a:cs typeface="Consolas" pitchFamily="49" charset="0"/>
-              </a:defRPr>
-            </a:lvl1pPr>
-          </a:lstStyle>
-          <a:p>
-            <a:pPr marL="0" lvl="0"/>
-            <a:r>
-              <a:rPr lang="en-US" noProof="1"/>
-              <a:t>Source code box</a:t>
-            </a:r>
-          </a:p>
-          <a:p>
-            <a:pPr marL="0" lvl="0"/>
-            <a:r>
-              <a:rPr lang="en-US" noProof="1"/>
-              <a:t>…</a:t>
-            </a:r>
-          </a:p>
-          <a:p>
-            <a:pPr marL="0" lvl="0"/>
-            <a:r>
-              <a:rPr lang="en-US" noProof="1"/>
-              <a:t>…</a:t>
-            </a:r>
-          </a:p>
-        </p:txBody>
-      </p:sp>
-      <p:sp>
-        <p:nvSpPr>
-          <p:cNvPr id="21" name="Slide Body Text">
-            <a:extLst>
-              <a:ext uri="{FF2B5EF4-FFF2-40B4-BE49-F238E27FC236}">
-                <a16:creationId xmlns:a16="http://schemas.microsoft.com/office/drawing/2014/main" id="{04F318BE-2BAD-4677-871C-D78A4BF0CBA6}"/>
-              </a:ext>
-            </a:extLst>
-          </p:cNvPr>
-          <p:cNvSpPr>
-            <a:spLocks noGrp="1"/>
-          </p:cNvSpPr>
-          <p:nvPr>
-            <p:ph type="body" sz="quarter" idx="10" hasCustomPrompt="1"/>
-          </p:nvPr>
-        </p:nvSpPr>
-        <p:spPr>
-          <a:xfrm>
-            <a:off x="190501" y="1196126"/>
-            <a:ext cx="11811097" cy="5561124"/>
-          </a:xfrm>
-        </p:spPr>
-        <p:txBody>
-          <a:bodyPr/>
-          <a:lstStyle>
-            <a:lvl1pPr marL="0" indent="0" latinLnBrk="0">
-              <a:buNone/>
-              <a:defRPr>
-                <a:solidFill>
-                  <a:schemeClr val="tx1"/>
-                </a:solidFill>
-              </a:defRPr>
-            </a:lvl1pPr>
-            <a:lvl2pPr marL="609219" indent="0">
-              <a:buNone/>
-              <a:defRPr/>
-            </a:lvl2pPr>
-          </a:lstStyle>
-          <a:p>
-            <a:pPr lvl="0"/>
-            <a:r>
-              <a:rPr lang="en-US" noProof="0"/>
-              <a:t>Sample source code:</a:t>
-            </a:r>
-          </a:p>
-        </p:txBody>
-      </p:sp>
-      <p:sp>
-        <p:nvSpPr>
           <p:cNvPr id="9" name="Rectangle Top">
             <a:extLst>
               <a:ext uri="{FF2B5EF4-FFF2-40B4-BE49-F238E27FC236}">
@@ -12906,6 +12772,182 @@
           </a:prstGeom>
         </p:spPr>
       </p:pic>
+      <p:sp>
+        <p:nvSpPr>
+          <p:cNvPr id="17" name="Slide Body Text">
+            <a:extLst>
+              <a:ext uri="{FF2B5EF4-FFF2-40B4-BE49-F238E27FC236}">
+                <a16:creationId xmlns:a16="http://schemas.microsoft.com/office/drawing/2014/main" id="{1E60575F-8475-4C78-97A7-27D7891D2770}"/>
+              </a:ext>
+            </a:extLst>
+          </p:cNvPr>
+          <p:cNvSpPr>
+            <a:spLocks noGrp="1"/>
+          </p:cNvSpPr>
+          <p:nvPr>
+            <p:ph type="body" sz="quarter" idx="12" hasCustomPrompt="1"/>
+          </p:nvPr>
+        </p:nvSpPr>
+        <p:spPr>
+          <a:xfrm>
+            <a:off x="190402" y="1196125"/>
+            <a:ext cx="11818096" cy="5528766"/>
+          </a:xfrm>
+        </p:spPr>
+        <p:txBody>
+          <a:bodyPr/>
+          <a:lstStyle>
+            <a:lvl1pPr latinLnBrk="0">
+              <a:defRPr/>
+            </a:lvl1pPr>
+            <a:lvl2pPr latinLnBrk="0">
+              <a:defRPr/>
+            </a:lvl2pPr>
+            <a:lvl3pPr latinLnBrk="0">
+              <a:defRPr/>
+            </a:lvl3pPr>
+            <a:lvl4pPr latinLnBrk="0">
+              <a:defRPr/>
+            </a:lvl4pPr>
+            <a:lvl5pPr latinLnBrk="0">
+              <a:defRPr/>
+            </a:lvl5pPr>
+          </a:lstStyle>
+          <a:p>
+            <a:pPr lvl="0"/>
+            <a:r>
+              <a:rPr lang="en-US" noProof="0" dirty="0"/>
+              <a:t>This is a code example</a:t>
+            </a:r>
+          </a:p>
+        </p:txBody>
+      </p:sp>
+      <p:sp>
+        <p:nvSpPr>
+          <p:cNvPr id="15" name="Code Box">
+            <a:extLst>
+              <a:ext uri="{FF2B5EF4-FFF2-40B4-BE49-F238E27FC236}">
+                <a16:creationId xmlns:a16="http://schemas.microsoft.com/office/drawing/2014/main" id="{29C63EC2-5578-406B-8C2A-23FDE6C14C82}"/>
+              </a:ext>
+            </a:extLst>
+          </p:cNvPr>
+          <p:cNvSpPr>
+            <a:spLocks noGrp="1"/>
+          </p:cNvSpPr>
+          <p:nvPr>
+            <p:ph type="body" sz="quarter" idx="11" hasCustomPrompt="1"/>
+          </p:nvPr>
+        </p:nvSpPr>
+        <p:spPr>
+          <a:xfrm>
+            <a:off x="674683" y="2034000"/>
+            <a:ext cx="10836275" cy="2318684"/>
+          </a:xfrm>
+          <a:solidFill>
+            <a:schemeClr val="accent6">
+              <a:lumMod val="75000"/>
+              <a:alpha val="15000"/>
+            </a:schemeClr>
+          </a:solidFill>
+          <a:ln w="12700">
+            <a:solidFill>
+              <a:schemeClr val="tx1">
+                <a:lumMod val="50000"/>
+              </a:schemeClr>
+            </a:solidFill>
+          </a:ln>
+        </p:spPr>
+        <p:txBody>
+          <a:bodyPr vert="horz" wrap="square" lIns="144000" tIns="108000" rIns="144000" bIns="108000" rtlCol="0">
+            <a:spAutoFit/>
+          </a:bodyPr>
+          <a:lstStyle>
+            <a:lvl1pPr>
+              <a:lnSpc>
+                <a:spcPct val="110000"/>
+              </a:lnSpc>
+              <a:spcBef>
+                <a:spcPts val="0"/>
+              </a:spcBef>
+              <a:spcAft>
+                <a:spcPts val="0"/>
+              </a:spcAft>
+              <a:buNone/>
+              <a:defRPr lang="en-US" sz="2800" b="1" smtClean="0">
+                <a:latin typeface="Consolas" pitchFamily="49" charset="0"/>
+              </a:defRPr>
+            </a:lvl1pPr>
+            <a:lvl2pPr>
+              <a:defRPr lang="en-US" smtClean="0"/>
+            </a:lvl2pPr>
+            <a:lvl3pPr>
+              <a:defRPr lang="en-US" smtClean="0"/>
+            </a:lvl3pPr>
+            <a:lvl4pPr>
+              <a:defRPr lang="en-US" smtClean="0"/>
+            </a:lvl4pPr>
+            <a:lvl5pPr>
+              <a:defRPr lang="en-US"/>
+            </a:lvl5pPr>
+          </a:lstStyle>
+          <a:p>
+            <a:pPr>
+              <a:spcBef>
+                <a:spcPts val="300"/>
+              </a:spcBef>
+              <a:spcAft>
+                <a:spcPts val="300"/>
+              </a:spcAft>
+            </a:pPr>
+            <a:r>
+              <a:rPr lang="en-US" noProof="1"/>
+              <a:t>Source code box</a:t>
+            </a:r>
+          </a:p>
+          <a:p>
+            <a:pPr>
+              <a:spcBef>
+                <a:spcPts val="300"/>
+              </a:spcBef>
+              <a:spcAft>
+                <a:spcPts val="300"/>
+              </a:spcAft>
+            </a:pPr>
+            <a:r>
+              <a:rPr lang="en-US" noProof="1"/>
+              <a:t>…</a:t>
+            </a:r>
+          </a:p>
+          <a:p>
+            <a:pPr>
+              <a:spcBef>
+                <a:spcPts val="300"/>
+              </a:spcBef>
+              <a:spcAft>
+                <a:spcPts val="300"/>
+              </a:spcAft>
+            </a:pPr>
+            <a:r>
+              <a:rPr lang="en-US" noProof="1"/>
+              <a:t>…</a:t>
+            </a:r>
+          </a:p>
+          <a:p>
+            <a:pPr>
+              <a:spcBef>
+                <a:spcPts val="300"/>
+              </a:spcBef>
+              <a:spcAft>
+                <a:spcPts val="300"/>
+              </a:spcAft>
+            </a:pPr>
+            <a:r>
+              <a:rPr lang="en-US" noProof="1"/>
+              <a:t>…</a:t>
+            </a:r>
+          </a:p>
+        </p:txBody>
+      </p:sp>
       <p:sp>
         <p:nvSpPr>
           <p:cNvPr id="11" name="Slide Title">
@@ -22405,7 +22447,7 @@
             <a:spLocks noGrp="1"/>
           </p:cNvSpPr>
           <p:nvPr>
-            <p:ph type="body" sz="quarter" idx="10"/>
+            <p:ph type="body" sz="quarter" idx="4294967295"/>
           </p:nvPr>
         </p:nvSpPr>
         <p:spPr>
@@ -22669,7 +22711,7 @@
             <a:spLocks noGrp="1"/>
           </p:cNvSpPr>
           <p:nvPr>
-            <p:ph type="body" sz="quarter" idx="11"/>
+            <p:ph type="body" sz="quarter" idx="4294967295"/>
           </p:nvPr>
         </p:nvSpPr>
         <p:spPr>
@@ -22679,7 +22721,9 @@
           </a:xfrm>
         </p:spPr>
         <p:txBody>
-          <a:bodyPr/>
+          <a:bodyPr>
+            <a:normAutofit fontScale="85000" lnSpcReduction="20000"/>
+          </a:bodyPr>
           <a:lstStyle/>
           <a:p>
             <a:r>
@@ -23443,7 +23487,7 @@
             <a:spLocks noGrp="1"/>
           </p:cNvSpPr>
           <p:nvPr>
-            <p:ph type="body" sz="quarter" idx="11"/>
+            <p:ph type="body" sz="quarter" idx="4294967295"/>
           </p:nvPr>
         </p:nvSpPr>
         <p:spPr>
@@ -32121,10 +32165,10 @@
       </p:sp>
       <p:sp>
         <p:nvSpPr>
-          <p:cNvPr id="6" name="Slide Body Text">
+          <p:cNvPr id="17" name="Text Placeholder 16">
             <a:extLst>
               <a:ext uri="{FF2B5EF4-FFF2-40B4-BE49-F238E27FC236}">
-                <a16:creationId xmlns:a16="http://schemas.microsoft.com/office/drawing/2014/main" id="{38B86428-EE97-4D8D-9368-EA7174A17221}"/>
+                <a16:creationId xmlns:a16="http://schemas.microsoft.com/office/drawing/2014/main" id="{D54E0A2B-08DB-403B-A994-E1735321B5DD}"/>
               </a:ext>
             </a:extLst>
           </p:cNvPr>
@@ -32132,7 +32176,7 @@
             <a:spLocks noGrp="1"/>
           </p:cNvSpPr>
           <p:nvPr>
-            <p:ph type="body" sz="quarter" idx="10"/>
+            <p:ph type="body" sz="quarter" idx="12"/>
           </p:nvPr>
         </p:nvSpPr>
         <p:spPr/>
@@ -32142,18 +32186,17 @@
           <a:p>
             <a:r>
               <a:rPr lang="en-US" dirty="0"/>
-              <a:t>Some JS class example:</a:t>
-            </a:r>
-            <a:endParaRPr lang="bg-BG" dirty="0"/>
+              <a:t>Some JS code example:</a:t>
+            </a:r>
           </a:p>
         </p:txBody>
       </p:sp>
       <p:sp>
         <p:nvSpPr>
-          <p:cNvPr id="7" name="Code Box">
+          <p:cNvPr id="6" name="Slide Body Text">
             <a:extLst>
               <a:ext uri="{FF2B5EF4-FFF2-40B4-BE49-F238E27FC236}">
-                <a16:creationId xmlns:a16="http://schemas.microsoft.com/office/drawing/2014/main" id="{608FC60A-0A26-44DD-82A6-EF4EB0DE6F3F}"/>
+                <a16:creationId xmlns:a16="http://schemas.microsoft.com/office/drawing/2014/main" id="{38B86428-EE97-4D8D-9368-EA7174A17221}"/>
               </a:ext>
             </a:extLst>
           </p:cNvPr>
@@ -32166,135 +32209,96 @@
         </p:nvSpPr>
         <p:spPr>
           <a:xfrm>
-            <a:off x="677678" y="2036307"/>
-            <a:ext cx="10836642" cy="4317693"/>
+            <a:off x="674683" y="2034000"/>
+            <a:ext cx="10836275" cy="3983756"/>
           </a:xfrm>
         </p:spPr>
         <p:txBody>
           <a:bodyPr/>
           <a:lstStyle/>
           <a:p>
-            <a:pPr>
-              <a:lnSpc>
-                <a:spcPct val="120000"/>
-              </a:lnSpc>
-              <a:spcBef>
-                <a:spcPts val="0"/>
-              </a:spcBef>
-            </a:pPr>
-            <a:r>
-              <a:rPr lang="en-US" sz="2800" dirty="0"/>
+            <a:r>
+              <a:rPr lang="en-US" dirty="0"/>
               <a:t>class Abstract {</a:t>
             </a:r>
           </a:p>
           <a:p>
-            <a:pPr>
-              <a:lnSpc>
-                <a:spcPct val="120000"/>
-              </a:lnSpc>
-              <a:spcBef>
-                <a:spcPts val="0"/>
-              </a:spcBef>
-            </a:pPr>
-            <a:r>
-              <a:rPr lang="en-US" sz="2800" dirty="0"/>
+            <a:r>
+              <a:rPr lang="en-US" dirty="0"/>
               <a:t>  constructor() {</a:t>
             </a:r>
           </a:p>
           <a:p>
-            <a:pPr>
-              <a:lnSpc>
-                <a:spcPct val="120000"/>
-              </a:lnSpc>
-              <a:spcBef>
-                <a:spcPts val="0"/>
-              </a:spcBef>
-            </a:pPr>
-            <a:r>
-              <a:rPr lang="en-US" sz="2800" dirty="0"/>
+            <a:r>
+              <a:rPr lang="en-US" dirty="0"/>
               <a:t>    if (</a:t>
             </a:r>
             <a:r>
-              <a:rPr lang="en-US" sz="2800" dirty="0">
+              <a:rPr lang="en-US" dirty="0" err="1">
                 <a:solidFill>
                   <a:schemeClr val="bg1"/>
                 </a:solidFill>
               </a:rPr>
-              <a:t>new.target </a:t>
-            </a:r>
-            <a:r>
-              <a:rPr lang="en-US" sz="2800" dirty="0"/>
+              <a:t>new.target</a:t>
+            </a:r>
+            <a:r>
+              <a:rPr lang="en-US" dirty="0">
+                <a:solidFill>
+                  <a:schemeClr val="bg1"/>
+                </a:solidFill>
+              </a:rPr>
+              <a:t> </a:t>
+            </a:r>
+            <a:r>
+              <a:rPr lang="en-US" dirty="0"/>
               <a:t>=== Abstract) {</a:t>
             </a:r>
           </a:p>
           <a:p>
-            <a:pPr>
-              <a:lnSpc>
-                <a:spcPct val="120000"/>
-              </a:lnSpc>
-              <a:spcBef>
-                <a:spcPts val="0"/>
-              </a:spcBef>
-            </a:pPr>
-            <a:r>
-              <a:rPr lang="en-US" sz="2800" dirty="0"/>
+            <a:pPr marL="1617663" indent="-1617663"/>
+            <a:r>
+              <a:rPr lang="en-US" dirty="0"/>
               <a:t>      </a:t>
             </a:r>
             <a:r>
-              <a:rPr lang="en-US" sz="2800" dirty="0">
+              <a:rPr lang="en-US" dirty="0">
                 <a:solidFill>
                   <a:schemeClr val="bg1"/>
                 </a:solidFill>
               </a:rPr>
-              <a:t>throw new TypeError</a:t>
-            </a:r>
-            <a:r>
-              <a:rPr lang="en-US" sz="2800" dirty="0"/>
-              <a:t>("Cannot construct Abstract</a:t>
-            </a:r>
-            <a:br>
-              <a:rPr lang="en-US" sz="2800" dirty="0"/>
-            </a:br>
-            <a:r>
-              <a:rPr lang="en-US" sz="2800" dirty="0"/>
-              <a:t>        instances directly");</a:t>
-            </a:r>
-            <a:br>
-              <a:rPr lang="en-US" sz="2800" dirty="0"/>
-            </a:br>
-            <a:r>
-              <a:rPr lang="en-US" sz="2800" dirty="0"/>
+              <a:t>throw new </a:t>
+            </a:r>
+            <a:r>
+              <a:rPr lang="en-US" dirty="0" err="1">
+                <a:solidFill>
+                  <a:schemeClr val="bg1"/>
+                </a:solidFill>
+              </a:rPr>
+              <a:t>TypeError</a:t>
+            </a:r>
+            <a:r>
+              <a:rPr lang="en-US" dirty="0"/>
+              <a:t>("Cannot construct Abstract instances directly");</a:t>
+            </a:r>
+          </a:p>
+          <a:p>
+            <a:r>
+              <a:rPr lang="en-US" dirty="0"/>
               <a:t>    }</a:t>
             </a:r>
           </a:p>
           <a:p>
-            <a:pPr>
-              <a:lnSpc>
-                <a:spcPct val="120000"/>
-              </a:lnSpc>
-              <a:spcBef>
-                <a:spcPts val="0"/>
-              </a:spcBef>
-            </a:pPr>
-            <a:r>
-              <a:rPr lang="en-US" sz="2800" dirty="0"/>
+            <a:r>
+              <a:rPr lang="en-US" dirty="0"/>
               <a:t>  }</a:t>
             </a:r>
           </a:p>
           <a:p>
-            <a:pPr>
-              <a:lnSpc>
-                <a:spcPct val="120000"/>
-              </a:lnSpc>
-              <a:spcBef>
-                <a:spcPts val="0"/>
-              </a:spcBef>
-            </a:pPr>
-            <a:r>
-              <a:rPr lang="en-US" sz="2800" dirty="0"/>
+            <a:r>
+              <a:rPr lang="en-US" dirty="0"/>
               <a:t>}</a:t>
             </a:r>
-            <a:endParaRPr lang="bg-BG" sz="2800" dirty="0"/>
+            <a:endParaRPr lang="bg-BG" dirty="0"/>
           </a:p>
         </p:txBody>
       </p:sp>
@@ -32314,12 +32318,7 @@
             <p:ph type="title"/>
           </p:nvPr>
         </p:nvSpPr>
-        <p:spPr>
-          <a:xfrm>
-            <a:off x="190405" y="100750"/>
-            <a:ext cx="9669213" cy="882654"/>
-          </a:xfrm>
-        </p:spPr>
+        <p:spPr/>
         <p:txBody>
           <a:bodyPr/>
           <a:lstStyle/>
@@ -32350,196 +32349,6 @@
       <p:transition spd="slow" advClick="0" advTm="5000"/>
     </mc:Fallback>
   </mc:AlternateContent>
-  <p:timing>
-    <p:tnLst>
-      <p:par>
-        <p:cTn id="1" dur="indefinite" restart="never" nodeType="tmRoot">
-          <p:childTnLst>
-            <p:seq concurrent="1" nextAc="seek">
-              <p:cTn id="2" dur="indefinite" nodeType="mainSeq">
-                <p:childTnLst>
-                  <p:par>
-                    <p:cTn id="3" fill="hold">
-                      <p:stCondLst>
-                        <p:cond delay="indefinite"/>
-                      </p:stCondLst>
-                      <p:childTnLst>
-                        <p:par>
-                          <p:cTn id="4" fill="hold">
-                            <p:stCondLst>
-                              <p:cond delay="0"/>
-                            </p:stCondLst>
-                            <p:childTnLst>
-                              <p:par>
-                                <p:cTn id="5" presetID="1" presetClass="entr" presetSubtype="0" fill="hold" nodeType="clickEffect">
-                                  <p:stCondLst>
-                                    <p:cond delay="0"/>
-                                  </p:stCondLst>
-                                  <p:childTnLst>
-                                    <p:set>
-                                      <p:cBhvr>
-                                        <p:cTn id="6" dur="1" fill="hold">
-                                          <p:stCondLst>
-                                            <p:cond delay="0"/>
-                                          </p:stCondLst>
-                                        </p:cTn>
-                                        <p:tgtEl>
-                                          <p:spTgt spid="7">
-                                            <p:txEl>
-                                              <p:pRg st="1" end="1"/>
-                                            </p:txEl>
-                                          </p:spTgt>
-                                        </p:tgtEl>
-                                        <p:attrNameLst>
-                                          <p:attrName>style.visibility</p:attrName>
-                                        </p:attrNameLst>
-                                      </p:cBhvr>
-                                      <p:to>
-                                        <p:strVal val="visible"/>
-                                      </p:to>
-                                    </p:set>
-                                  </p:childTnLst>
-                                </p:cTn>
-                              </p:par>
-                              <p:par>
-                                <p:cTn id="7" presetID="1" presetClass="entr" presetSubtype="0" fill="hold" nodeType="withEffect">
-                                  <p:stCondLst>
-                                    <p:cond delay="0"/>
-                                  </p:stCondLst>
-                                  <p:childTnLst>
-                                    <p:set>
-                                      <p:cBhvr>
-                                        <p:cTn id="8" dur="1" fill="hold">
-                                          <p:stCondLst>
-                                            <p:cond delay="0"/>
-                                          </p:stCondLst>
-                                        </p:cTn>
-                                        <p:tgtEl>
-                                          <p:spTgt spid="7">
-                                            <p:txEl>
-                                              <p:pRg st="4" end="4"/>
-                                            </p:txEl>
-                                          </p:spTgt>
-                                        </p:tgtEl>
-                                        <p:attrNameLst>
-                                          <p:attrName>style.visibility</p:attrName>
-                                        </p:attrNameLst>
-                                      </p:cBhvr>
-                                      <p:to>
-                                        <p:strVal val="visible"/>
-                                      </p:to>
-                                    </p:set>
-                                  </p:childTnLst>
-                                </p:cTn>
-                              </p:par>
-                            </p:childTnLst>
-                          </p:cTn>
-                        </p:par>
-                      </p:childTnLst>
-                    </p:cTn>
-                  </p:par>
-                  <p:par>
-                    <p:cTn id="9" fill="hold">
-                      <p:stCondLst>
-                        <p:cond delay="indefinite"/>
-                      </p:stCondLst>
-                      <p:childTnLst>
-                        <p:par>
-                          <p:cTn id="10" fill="hold">
-                            <p:stCondLst>
-                              <p:cond delay="0"/>
-                            </p:stCondLst>
-                            <p:childTnLst>
-                              <p:par>
-                                <p:cTn id="11" presetID="1" presetClass="entr" presetSubtype="0" fill="hold" nodeType="clickEffect">
-                                  <p:stCondLst>
-                                    <p:cond delay="0"/>
-                                  </p:stCondLst>
-                                  <p:childTnLst>
-                                    <p:set>
-                                      <p:cBhvr>
-                                        <p:cTn id="12" dur="1" fill="hold">
-                                          <p:stCondLst>
-                                            <p:cond delay="0"/>
-                                          </p:stCondLst>
-                                        </p:cTn>
-                                        <p:tgtEl>
-                                          <p:spTgt spid="7">
-                                            <p:txEl>
-                                              <p:pRg st="2" end="2"/>
-                                            </p:txEl>
-                                          </p:spTgt>
-                                        </p:tgtEl>
-                                        <p:attrNameLst>
-                                          <p:attrName>style.visibility</p:attrName>
-                                        </p:attrNameLst>
-                                      </p:cBhvr>
-                                      <p:to>
-                                        <p:strVal val="visible"/>
-                                      </p:to>
-                                    </p:set>
-                                  </p:childTnLst>
-                                </p:cTn>
-                              </p:par>
-                              <p:par>
-                                <p:cTn id="13" presetID="1" presetClass="entr" presetSubtype="0" fill="hold" nodeType="withEffect">
-                                  <p:stCondLst>
-                                    <p:cond delay="0"/>
-                                  </p:stCondLst>
-                                  <p:childTnLst>
-                                    <p:set>
-                                      <p:cBhvr>
-                                        <p:cTn id="14" dur="1" fill="hold">
-                                          <p:stCondLst>
-                                            <p:cond delay="0"/>
-                                          </p:stCondLst>
-                                        </p:cTn>
-                                        <p:tgtEl>
-                                          <p:spTgt spid="7">
-                                            <p:txEl>
-                                              <p:pRg st="3" end="3"/>
-                                            </p:txEl>
-                                          </p:spTgt>
-                                        </p:tgtEl>
-                                        <p:attrNameLst>
-                                          <p:attrName>style.visibility</p:attrName>
-                                        </p:attrNameLst>
-                                      </p:cBhvr>
-                                      <p:to>
-                                        <p:strVal val="visible"/>
-                                      </p:to>
-                                    </p:set>
-                                  </p:childTnLst>
-                                </p:cTn>
-                              </p:par>
-                            </p:childTnLst>
-                          </p:cTn>
-                        </p:par>
-                      </p:childTnLst>
-                    </p:cTn>
-                  </p:par>
-                </p:childTnLst>
-              </p:cTn>
-              <p:prevCondLst>
-                <p:cond evt="onPrev" delay="0">
-                  <p:tgtEl>
-                    <p:sldTgt/>
-                  </p:tgtEl>
-                </p:cond>
-              </p:prevCondLst>
-              <p:nextCondLst>
-                <p:cond evt="onNext" delay="0">
-                  <p:tgtEl>
-                    <p:sldTgt/>
-                  </p:tgtEl>
-                </p:cond>
-              </p:nextCondLst>
-            </p:seq>
-          </p:childTnLst>
-        </p:cTn>
-      </p:par>
-    </p:tnLst>
-  </p:timing>
 </p:sld>
 </file>
 

</xml_diff>